<commit_message>
Work on figures and sensitivity analysis level 1 complete
</commit_message>
<xml_diff>
--- a/Documents/Figures.pptx
+++ b/Documents/Figures.pptx
@@ -6,16 +6,16 @@
   </p:sldMasterIdLst>
   <p:sldIdLst>
     <p:sldId id="256" r:id="rId2"/>
-    <p:sldId id="260" r:id="rId3"/>
-    <p:sldId id="261" r:id="rId4"/>
-    <p:sldId id="262" r:id="rId5"/>
-    <p:sldId id="263" r:id="rId6"/>
-    <p:sldId id="264" r:id="rId7"/>
-    <p:sldId id="265" r:id="rId8"/>
-    <p:sldId id="266" r:id="rId9"/>
-    <p:sldId id="267" r:id="rId10"/>
-    <p:sldId id="268" r:id="rId11"/>
-    <p:sldId id="269" r:id="rId12"/>
+    <p:sldId id="261" r:id="rId3"/>
+    <p:sldId id="262" r:id="rId4"/>
+    <p:sldId id="263" r:id="rId5"/>
+    <p:sldId id="264" r:id="rId6"/>
+    <p:sldId id="265" r:id="rId7"/>
+    <p:sldId id="266" r:id="rId8"/>
+    <p:sldId id="267" r:id="rId9"/>
+    <p:sldId id="268" r:id="rId10"/>
+    <p:sldId id="269" r:id="rId11"/>
+    <p:sldId id="260" r:id="rId12"/>
     <p:sldId id="270" r:id="rId13"/>
     <p:sldId id="271" r:id="rId14"/>
     <p:sldId id="272" r:id="rId15"/>
@@ -119,6 +119,11 @@
       </a:defRPr>
     </a:lvl9pPr>
   </p:defaultTextStyle>
+  <p:extLst>
+    <p:ext uri="{EFAFB233-063F-42B5-8137-9DF3F51BA10A}">
+      <p15:sldGuideLst xmlns:p15="http://schemas.microsoft.com/office/powerpoint/2012/main"/>
+    </p:ext>
+  </p:extLst>
 </p:presentation>
 </file>
 
@@ -205,35 +210,35 @@
               <a:buNone/>
               <a:defRPr sz="2400"/>
             </a:lvl1pPr>
-            <a:lvl2pPr marL="457200" indent="0" algn="ctr">
+            <a:lvl2pPr marL="457189" indent="0" algn="ctr">
               <a:buNone/>
               <a:defRPr sz="2000"/>
             </a:lvl2pPr>
-            <a:lvl3pPr marL="914400" indent="0" algn="ctr">
+            <a:lvl3pPr marL="914377" indent="0" algn="ctr">
               <a:buNone/>
               <a:defRPr sz="1800"/>
             </a:lvl3pPr>
-            <a:lvl4pPr marL="1371600" indent="0" algn="ctr">
+            <a:lvl4pPr marL="1371566" indent="0" algn="ctr">
               <a:buNone/>
               <a:defRPr sz="1600"/>
             </a:lvl4pPr>
-            <a:lvl5pPr marL="1828800" indent="0" algn="ctr">
+            <a:lvl5pPr marL="1828754" indent="0" algn="ctr">
               <a:buNone/>
               <a:defRPr sz="1600"/>
             </a:lvl5pPr>
-            <a:lvl6pPr marL="2286000" indent="0" algn="ctr">
+            <a:lvl6pPr marL="2285943" indent="0" algn="ctr">
               <a:buNone/>
               <a:defRPr sz="1600"/>
             </a:lvl6pPr>
-            <a:lvl7pPr marL="2743200" indent="0" algn="ctr">
+            <a:lvl7pPr marL="2743131" indent="0" algn="ctr">
               <a:buNone/>
               <a:defRPr sz="1600"/>
             </a:lvl7pPr>
-            <a:lvl8pPr marL="3200400" indent="0" algn="ctr">
+            <a:lvl8pPr marL="3200320" indent="0" algn="ctr">
               <a:buNone/>
               <a:defRPr sz="1600"/>
             </a:lvl8pPr>
-            <a:lvl9pPr marL="3657600" indent="0" algn="ctr">
+            <a:lvl9pPr marL="3657509" indent="0" algn="ctr">
               <a:buNone/>
               <a:defRPr sz="1600"/>
             </a:lvl9pPr>
@@ -269,7 +274,7 @@
           <a:p>
             <a:fld id="{F805C730-C72D-4F4C-BEDB-18E2859B352B}" type="datetimeFigureOut">
               <a:rPr lang="en-US" smtClean="0"/>
-              <a:t>11/1/2022</a:t>
+              <a:t>11/2/2022</a:t>
             </a:fld>
             <a:endParaRPr lang="en-US"/>
           </a:p>
@@ -467,7 +472,7 @@
           <a:p>
             <a:fld id="{F805C730-C72D-4F4C-BEDB-18E2859B352B}" type="datetimeFigureOut">
               <a:rPr lang="en-US" smtClean="0"/>
-              <a:t>11/1/2022</a:t>
+              <a:t>11/2/2022</a:t>
             </a:fld>
             <a:endParaRPr lang="en-US"/>
           </a:p>
@@ -575,7 +580,7 @@
         </p:nvSpPr>
         <p:spPr>
           <a:xfrm>
-            <a:off x="8724900" y="365125"/>
+            <a:off x="8724901" y="365125"/>
             <a:ext cx="2628900" cy="5811838"/>
           </a:xfrm>
         </p:spPr>
@@ -608,7 +613,7 @@
         </p:nvSpPr>
         <p:spPr>
           <a:xfrm>
-            <a:off x="838200" y="365125"/>
+            <a:off x="838201" y="365125"/>
             <a:ext cx="7734300" cy="5811838"/>
           </a:xfrm>
         </p:spPr>
@@ -675,7 +680,7 @@
           <a:p>
             <a:fld id="{F805C730-C72D-4F4C-BEDB-18E2859B352B}" type="datetimeFigureOut">
               <a:rPr lang="en-US" smtClean="0"/>
-              <a:t>11/1/2022</a:t>
+              <a:t>11/2/2022</a:t>
             </a:fld>
             <a:endParaRPr lang="en-US"/>
           </a:p>
@@ -873,7 +878,7 @@
           <a:p>
             <a:fld id="{F805C730-C72D-4F4C-BEDB-18E2859B352B}" type="datetimeFigureOut">
               <a:rPr lang="en-US" smtClean="0"/>
-              <a:t>11/1/2022</a:t>
+              <a:t>11/2/2022</a:t>
             </a:fld>
             <a:endParaRPr lang="en-US"/>
           </a:p>
@@ -981,7 +986,7 @@
         </p:nvSpPr>
         <p:spPr>
           <a:xfrm>
-            <a:off x="831850" y="1709738"/>
+            <a:off x="831851" y="1709740"/>
             <a:ext cx="10515600" cy="2852737"/>
           </a:xfrm>
         </p:spPr>
@@ -1018,7 +1023,7 @@
         </p:nvSpPr>
         <p:spPr>
           <a:xfrm>
-            <a:off x="831850" y="4589463"/>
+            <a:off x="831851" y="4589465"/>
             <a:ext cx="10515600" cy="1500187"/>
           </a:xfrm>
         </p:spPr>
@@ -1035,7 +1040,7 @@
                 </a:solidFill>
               </a:defRPr>
             </a:lvl1pPr>
-            <a:lvl2pPr marL="457200" indent="0">
+            <a:lvl2pPr marL="457189" indent="0">
               <a:buNone/>
               <a:defRPr sz="2000">
                 <a:solidFill>
@@ -1045,7 +1050,7 @@
                 </a:solidFill>
               </a:defRPr>
             </a:lvl2pPr>
-            <a:lvl3pPr marL="914400" indent="0">
+            <a:lvl3pPr marL="914377" indent="0">
               <a:buNone/>
               <a:defRPr sz="1800">
                 <a:solidFill>
@@ -1055,7 +1060,7 @@
                 </a:solidFill>
               </a:defRPr>
             </a:lvl3pPr>
-            <a:lvl4pPr marL="1371600" indent="0">
+            <a:lvl4pPr marL="1371566" indent="0">
               <a:buNone/>
               <a:defRPr sz="1600">
                 <a:solidFill>
@@ -1065,7 +1070,7 @@
                 </a:solidFill>
               </a:defRPr>
             </a:lvl4pPr>
-            <a:lvl5pPr marL="1828800" indent="0">
+            <a:lvl5pPr marL="1828754" indent="0">
               <a:buNone/>
               <a:defRPr sz="1600">
                 <a:solidFill>
@@ -1075,7 +1080,7 @@
                 </a:solidFill>
               </a:defRPr>
             </a:lvl5pPr>
-            <a:lvl6pPr marL="2286000" indent="0">
+            <a:lvl6pPr marL="2285943" indent="0">
               <a:buNone/>
               <a:defRPr sz="1600">
                 <a:solidFill>
@@ -1085,7 +1090,7 @@
                 </a:solidFill>
               </a:defRPr>
             </a:lvl6pPr>
-            <a:lvl7pPr marL="2743200" indent="0">
+            <a:lvl7pPr marL="2743131" indent="0">
               <a:buNone/>
               <a:defRPr sz="1600">
                 <a:solidFill>
@@ -1095,7 +1100,7 @@
                 </a:solidFill>
               </a:defRPr>
             </a:lvl7pPr>
-            <a:lvl8pPr marL="3200400" indent="0">
+            <a:lvl8pPr marL="3200320" indent="0">
               <a:buNone/>
               <a:defRPr sz="1600">
                 <a:solidFill>
@@ -1105,7 +1110,7 @@
                 </a:solidFill>
               </a:defRPr>
             </a:lvl8pPr>
-            <a:lvl9pPr marL="3657600" indent="0">
+            <a:lvl9pPr marL="3657509" indent="0">
               <a:buNone/>
               <a:defRPr sz="1600">
                 <a:solidFill>
@@ -1148,7 +1153,7 @@
           <a:p>
             <a:fld id="{F805C730-C72D-4F4C-BEDB-18E2859B352B}" type="datetimeFigureOut">
               <a:rPr lang="en-US" smtClean="0"/>
-              <a:t>11/1/2022</a:t>
+              <a:t>11/2/2022</a:t>
             </a:fld>
             <a:endParaRPr lang="en-US"/>
           </a:p>
@@ -1413,7 +1418,7 @@
           <a:p>
             <a:fld id="{F805C730-C72D-4F4C-BEDB-18E2859B352B}" type="datetimeFigureOut">
               <a:rPr lang="en-US" smtClean="0"/>
-              <a:t>11/1/2022</a:t>
+              <a:t>11/2/2022</a:t>
             </a:fld>
             <a:endParaRPr lang="en-US"/>
           </a:p>
@@ -1521,7 +1526,7 @@
         </p:nvSpPr>
         <p:spPr>
           <a:xfrm>
-            <a:off x="839788" y="365125"/>
+            <a:off x="839788" y="365127"/>
             <a:ext cx="10515600" cy="1325563"/>
           </a:xfrm>
         </p:spPr>
@@ -1554,7 +1559,7 @@
         </p:nvSpPr>
         <p:spPr>
           <a:xfrm>
-            <a:off x="839788" y="1681163"/>
+            <a:off x="839789" y="1681163"/>
             <a:ext cx="5157787" cy="823912"/>
           </a:xfrm>
         </p:spPr>
@@ -1565,35 +1570,35 @@
               <a:buNone/>
               <a:defRPr sz="2400" b="1"/>
             </a:lvl1pPr>
-            <a:lvl2pPr marL="457200" indent="0">
+            <a:lvl2pPr marL="457189" indent="0">
               <a:buNone/>
               <a:defRPr sz="2000" b="1"/>
             </a:lvl2pPr>
-            <a:lvl3pPr marL="914400" indent="0">
+            <a:lvl3pPr marL="914377" indent="0">
               <a:buNone/>
               <a:defRPr sz="1800" b="1"/>
             </a:lvl3pPr>
-            <a:lvl4pPr marL="1371600" indent="0">
+            <a:lvl4pPr marL="1371566" indent="0">
               <a:buNone/>
               <a:defRPr sz="1600" b="1"/>
             </a:lvl4pPr>
-            <a:lvl5pPr marL="1828800" indent="0">
+            <a:lvl5pPr marL="1828754" indent="0">
               <a:buNone/>
               <a:defRPr sz="1600" b="1"/>
             </a:lvl5pPr>
-            <a:lvl6pPr marL="2286000" indent="0">
+            <a:lvl6pPr marL="2285943" indent="0">
               <a:buNone/>
               <a:defRPr sz="1600" b="1"/>
             </a:lvl6pPr>
-            <a:lvl7pPr marL="2743200" indent="0">
+            <a:lvl7pPr marL="2743131" indent="0">
               <a:buNone/>
               <a:defRPr sz="1600" b="1"/>
             </a:lvl7pPr>
-            <a:lvl8pPr marL="3200400" indent="0">
+            <a:lvl8pPr marL="3200320" indent="0">
               <a:buNone/>
               <a:defRPr sz="1600" b="1"/>
             </a:lvl8pPr>
-            <a:lvl9pPr marL="3657600" indent="0">
+            <a:lvl9pPr marL="3657509" indent="0">
               <a:buNone/>
               <a:defRPr sz="1600" b="1"/>
             </a:lvl9pPr>
@@ -1625,7 +1630,7 @@
         </p:nvSpPr>
         <p:spPr>
           <a:xfrm>
-            <a:off x="839788" y="2505075"/>
+            <a:off x="839789" y="2505075"/>
             <a:ext cx="5157787" cy="3684588"/>
           </a:xfrm>
         </p:spPr>
@@ -1687,7 +1692,7 @@
         </p:nvSpPr>
         <p:spPr>
           <a:xfrm>
-            <a:off x="6172200" y="1681163"/>
+            <a:off x="6172201" y="1681163"/>
             <a:ext cx="5183188" cy="823912"/>
           </a:xfrm>
         </p:spPr>
@@ -1698,35 +1703,35 @@
               <a:buNone/>
               <a:defRPr sz="2400" b="1"/>
             </a:lvl1pPr>
-            <a:lvl2pPr marL="457200" indent="0">
+            <a:lvl2pPr marL="457189" indent="0">
               <a:buNone/>
               <a:defRPr sz="2000" b="1"/>
             </a:lvl2pPr>
-            <a:lvl3pPr marL="914400" indent="0">
+            <a:lvl3pPr marL="914377" indent="0">
               <a:buNone/>
               <a:defRPr sz="1800" b="1"/>
             </a:lvl3pPr>
-            <a:lvl4pPr marL="1371600" indent="0">
+            <a:lvl4pPr marL="1371566" indent="0">
               <a:buNone/>
               <a:defRPr sz="1600" b="1"/>
             </a:lvl4pPr>
-            <a:lvl5pPr marL="1828800" indent="0">
+            <a:lvl5pPr marL="1828754" indent="0">
               <a:buNone/>
               <a:defRPr sz="1600" b="1"/>
             </a:lvl5pPr>
-            <a:lvl6pPr marL="2286000" indent="0">
+            <a:lvl6pPr marL="2285943" indent="0">
               <a:buNone/>
               <a:defRPr sz="1600" b="1"/>
             </a:lvl6pPr>
-            <a:lvl7pPr marL="2743200" indent="0">
+            <a:lvl7pPr marL="2743131" indent="0">
               <a:buNone/>
               <a:defRPr sz="1600" b="1"/>
             </a:lvl7pPr>
-            <a:lvl8pPr marL="3200400" indent="0">
+            <a:lvl8pPr marL="3200320" indent="0">
               <a:buNone/>
               <a:defRPr sz="1600" b="1"/>
             </a:lvl8pPr>
-            <a:lvl9pPr marL="3657600" indent="0">
+            <a:lvl9pPr marL="3657509" indent="0">
               <a:buNone/>
               <a:defRPr sz="1600" b="1"/>
             </a:lvl9pPr>
@@ -1758,7 +1763,7 @@
         </p:nvSpPr>
         <p:spPr>
           <a:xfrm>
-            <a:off x="6172200" y="2505075"/>
+            <a:off x="6172201" y="2505075"/>
             <a:ext cx="5183188" cy="3684588"/>
           </a:xfrm>
         </p:spPr>
@@ -1825,7 +1830,7 @@
           <a:p>
             <a:fld id="{F805C730-C72D-4F4C-BEDB-18E2859B352B}" type="datetimeFigureOut">
               <a:rPr lang="en-US" smtClean="0"/>
-              <a:t>11/1/2022</a:t>
+              <a:t>11/2/2022</a:t>
             </a:fld>
             <a:endParaRPr lang="en-US"/>
           </a:p>
@@ -1966,7 +1971,7 @@
           <a:p>
             <a:fld id="{F805C730-C72D-4F4C-BEDB-18E2859B352B}" type="datetimeFigureOut">
               <a:rPr lang="en-US" smtClean="0"/>
-              <a:t>11/1/2022</a:t>
+              <a:t>11/2/2022</a:t>
             </a:fld>
             <a:endParaRPr lang="en-US"/>
           </a:p>
@@ -2079,7 +2084,7 @@
           <a:p>
             <a:fld id="{F805C730-C72D-4F4C-BEDB-18E2859B352B}" type="datetimeFigureOut">
               <a:rPr lang="en-US" smtClean="0"/>
-              <a:t>11/1/2022</a:t>
+              <a:t>11/2/2022</a:t>
             </a:fld>
             <a:endParaRPr lang="en-US"/>
           </a:p>
@@ -2224,7 +2229,7 @@
         </p:nvSpPr>
         <p:spPr>
           <a:xfrm>
-            <a:off x="5183188" y="987425"/>
+            <a:off x="5183188" y="987427"/>
             <a:ext cx="6172200" cy="4873625"/>
           </a:xfrm>
         </p:spPr>
@@ -2325,35 +2330,35 @@
               <a:buNone/>
               <a:defRPr sz="1600"/>
             </a:lvl1pPr>
-            <a:lvl2pPr marL="457200" indent="0">
+            <a:lvl2pPr marL="457189" indent="0">
               <a:buNone/>
               <a:defRPr sz="1400"/>
             </a:lvl2pPr>
-            <a:lvl3pPr marL="914400" indent="0">
+            <a:lvl3pPr marL="914377" indent="0">
               <a:buNone/>
               <a:defRPr sz="1200"/>
             </a:lvl3pPr>
-            <a:lvl4pPr marL="1371600" indent="0">
+            <a:lvl4pPr marL="1371566" indent="0">
               <a:buNone/>
               <a:defRPr sz="1000"/>
             </a:lvl4pPr>
-            <a:lvl5pPr marL="1828800" indent="0">
+            <a:lvl5pPr marL="1828754" indent="0">
               <a:buNone/>
               <a:defRPr sz="1000"/>
             </a:lvl5pPr>
-            <a:lvl6pPr marL="2286000" indent="0">
+            <a:lvl6pPr marL="2285943" indent="0">
               <a:buNone/>
               <a:defRPr sz="1000"/>
             </a:lvl6pPr>
-            <a:lvl7pPr marL="2743200" indent="0">
+            <a:lvl7pPr marL="2743131" indent="0">
               <a:buNone/>
               <a:defRPr sz="1000"/>
             </a:lvl7pPr>
-            <a:lvl8pPr marL="3200400" indent="0">
+            <a:lvl8pPr marL="3200320" indent="0">
               <a:buNone/>
               <a:defRPr sz="1000"/>
             </a:lvl8pPr>
-            <a:lvl9pPr marL="3657600" indent="0">
+            <a:lvl9pPr marL="3657509" indent="0">
               <a:buNone/>
               <a:defRPr sz="1000"/>
             </a:lvl9pPr>
@@ -2390,7 +2395,7 @@
           <a:p>
             <a:fld id="{F805C730-C72D-4F4C-BEDB-18E2859B352B}" type="datetimeFigureOut">
               <a:rPr lang="en-US" smtClean="0"/>
-              <a:t>11/1/2022</a:t>
+              <a:t>11/2/2022</a:t>
             </a:fld>
             <a:endParaRPr lang="en-US"/>
           </a:p>
@@ -2535,7 +2540,7 @@
         </p:nvSpPr>
         <p:spPr>
           <a:xfrm>
-            <a:off x="5183188" y="987425"/>
+            <a:off x="5183188" y="987427"/>
             <a:ext cx="6172200" cy="4873625"/>
           </a:xfrm>
         </p:spPr>
@@ -2546,35 +2551,35 @@
               <a:buNone/>
               <a:defRPr sz="3200"/>
             </a:lvl1pPr>
-            <a:lvl2pPr marL="457200" indent="0">
+            <a:lvl2pPr marL="457189" indent="0">
               <a:buNone/>
               <a:defRPr sz="2800"/>
             </a:lvl2pPr>
-            <a:lvl3pPr marL="914400" indent="0">
+            <a:lvl3pPr marL="914377" indent="0">
               <a:buNone/>
               <a:defRPr sz="2400"/>
             </a:lvl3pPr>
-            <a:lvl4pPr marL="1371600" indent="0">
+            <a:lvl4pPr marL="1371566" indent="0">
               <a:buNone/>
               <a:defRPr sz="2000"/>
             </a:lvl4pPr>
-            <a:lvl5pPr marL="1828800" indent="0">
+            <a:lvl5pPr marL="1828754" indent="0">
               <a:buNone/>
               <a:defRPr sz="2000"/>
             </a:lvl5pPr>
-            <a:lvl6pPr marL="2286000" indent="0">
+            <a:lvl6pPr marL="2285943" indent="0">
               <a:buNone/>
               <a:defRPr sz="2000"/>
             </a:lvl6pPr>
-            <a:lvl7pPr marL="2743200" indent="0">
+            <a:lvl7pPr marL="2743131" indent="0">
               <a:buNone/>
               <a:defRPr sz="2000"/>
             </a:lvl7pPr>
-            <a:lvl8pPr marL="3200400" indent="0">
+            <a:lvl8pPr marL="3200320" indent="0">
               <a:buNone/>
               <a:defRPr sz="2000"/>
             </a:lvl8pPr>
-            <a:lvl9pPr marL="3657600" indent="0">
+            <a:lvl9pPr marL="3657509" indent="0">
               <a:buNone/>
               <a:defRPr sz="2000"/>
             </a:lvl9pPr>
@@ -2613,35 +2618,35 @@
               <a:buNone/>
               <a:defRPr sz="1600"/>
             </a:lvl1pPr>
-            <a:lvl2pPr marL="457200" indent="0">
+            <a:lvl2pPr marL="457189" indent="0">
               <a:buNone/>
               <a:defRPr sz="1400"/>
             </a:lvl2pPr>
-            <a:lvl3pPr marL="914400" indent="0">
+            <a:lvl3pPr marL="914377" indent="0">
               <a:buNone/>
               <a:defRPr sz="1200"/>
             </a:lvl3pPr>
-            <a:lvl4pPr marL="1371600" indent="0">
+            <a:lvl4pPr marL="1371566" indent="0">
               <a:buNone/>
               <a:defRPr sz="1000"/>
             </a:lvl4pPr>
-            <a:lvl5pPr marL="1828800" indent="0">
+            <a:lvl5pPr marL="1828754" indent="0">
               <a:buNone/>
               <a:defRPr sz="1000"/>
             </a:lvl5pPr>
-            <a:lvl6pPr marL="2286000" indent="0">
+            <a:lvl6pPr marL="2285943" indent="0">
               <a:buNone/>
               <a:defRPr sz="1000"/>
             </a:lvl6pPr>
-            <a:lvl7pPr marL="2743200" indent="0">
+            <a:lvl7pPr marL="2743131" indent="0">
               <a:buNone/>
               <a:defRPr sz="1000"/>
             </a:lvl7pPr>
-            <a:lvl8pPr marL="3200400" indent="0">
+            <a:lvl8pPr marL="3200320" indent="0">
               <a:buNone/>
               <a:defRPr sz="1000"/>
             </a:lvl8pPr>
-            <a:lvl9pPr marL="3657600" indent="0">
+            <a:lvl9pPr marL="3657509" indent="0">
               <a:buNone/>
               <a:defRPr sz="1000"/>
             </a:lvl9pPr>
@@ -2678,7 +2683,7 @@
           <a:p>
             <a:fld id="{F805C730-C72D-4F4C-BEDB-18E2859B352B}" type="datetimeFigureOut">
               <a:rPr lang="en-US" smtClean="0"/>
-              <a:t>11/1/2022</a:t>
+              <a:t>11/2/2022</a:t>
             </a:fld>
             <a:endParaRPr lang="en-US"/>
           </a:p>
@@ -2791,7 +2796,7 @@
         </p:nvSpPr>
         <p:spPr>
           <a:xfrm>
-            <a:off x="838200" y="365125"/>
+            <a:off x="838200" y="365127"/>
             <a:ext cx="10515600" cy="1325563"/>
           </a:xfrm>
           <a:prstGeom prst="rect">
@@ -2896,7 +2901,7 @@
         </p:nvSpPr>
         <p:spPr>
           <a:xfrm>
-            <a:off x="838200" y="6356350"/>
+            <a:off x="838200" y="6356352"/>
             <a:ext cx="2743200" cy="365125"/>
           </a:xfrm>
           <a:prstGeom prst="rect">
@@ -2919,7 +2924,7 @@
           <a:p>
             <a:fld id="{F805C730-C72D-4F4C-BEDB-18E2859B352B}" type="datetimeFigureOut">
               <a:rPr lang="en-US" smtClean="0"/>
-              <a:t>11/1/2022</a:t>
+              <a:t>11/2/2022</a:t>
             </a:fld>
             <a:endParaRPr lang="en-US"/>
           </a:p>
@@ -2943,7 +2948,7 @@
         </p:nvSpPr>
         <p:spPr>
           <a:xfrm>
-            <a:off x="4038600" y="6356350"/>
+            <a:off x="4038600" y="6356352"/>
             <a:ext cx="4114800" cy="365125"/>
           </a:xfrm>
           <a:prstGeom prst="rect">
@@ -2986,7 +2991,7 @@
         </p:nvSpPr>
         <p:spPr>
           <a:xfrm>
-            <a:off x="8610600" y="6356350"/>
+            <a:off x="8610600" y="6356352"/>
             <a:ext cx="2743200" cy="365125"/>
           </a:xfrm>
           <a:prstGeom prst="rect">
@@ -3038,7 +3043,7 @@
   </p:sldLayoutIdLst>
   <p:txStyles>
     <p:titleStyle>
-      <a:lvl1pPr algn="l" defTabSz="914400" rtl="0" eaLnBrk="1" latinLnBrk="0" hangingPunct="1">
+      <a:lvl1pPr algn="l" defTabSz="914377" rtl="0" eaLnBrk="1" latinLnBrk="0" hangingPunct="1">
         <a:lnSpc>
           <a:spcPct val="90000"/>
         </a:lnSpc>
@@ -3057,7 +3062,7 @@
       </a:lvl1pPr>
     </p:titleStyle>
     <p:bodyStyle>
-      <a:lvl1pPr marL="228600" indent="-228600" algn="l" defTabSz="914400" rtl="0" eaLnBrk="1" latinLnBrk="0" hangingPunct="1">
+      <a:lvl1pPr marL="228594" indent="-228594" algn="l" defTabSz="914377" rtl="0" eaLnBrk="1" latinLnBrk="0" hangingPunct="1">
         <a:lnSpc>
           <a:spcPct val="90000"/>
         </a:lnSpc>
@@ -3075,7 +3080,7 @@
           <a:cs typeface="+mn-cs"/>
         </a:defRPr>
       </a:lvl1pPr>
-      <a:lvl2pPr marL="685800" indent="-228600" algn="l" defTabSz="914400" rtl="0" eaLnBrk="1" latinLnBrk="0" hangingPunct="1">
+      <a:lvl2pPr marL="685783" indent="-228594" algn="l" defTabSz="914377" rtl="0" eaLnBrk="1" latinLnBrk="0" hangingPunct="1">
         <a:lnSpc>
           <a:spcPct val="90000"/>
         </a:lnSpc>
@@ -3093,7 +3098,7 @@
           <a:cs typeface="+mn-cs"/>
         </a:defRPr>
       </a:lvl2pPr>
-      <a:lvl3pPr marL="1143000" indent="-228600" algn="l" defTabSz="914400" rtl="0" eaLnBrk="1" latinLnBrk="0" hangingPunct="1">
+      <a:lvl3pPr marL="1142971" indent="-228594" algn="l" defTabSz="914377" rtl="0" eaLnBrk="1" latinLnBrk="0" hangingPunct="1">
         <a:lnSpc>
           <a:spcPct val="90000"/>
         </a:lnSpc>
@@ -3111,7 +3116,7 @@
           <a:cs typeface="+mn-cs"/>
         </a:defRPr>
       </a:lvl3pPr>
-      <a:lvl4pPr marL="1600200" indent="-228600" algn="l" defTabSz="914400" rtl="0" eaLnBrk="1" latinLnBrk="0" hangingPunct="1">
+      <a:lvl4pPr marL="1600160" indent="-228594" algn="l" defTabSz="914377" rtl="0" eaLnBrk="1" latinLnBrk="0" hangingPunct="1">
         <a:lnSpc>
           <a:spcPct val="90000"/>
         </a:lnSpc>
@@ -3129,7 +3134,7 @@
           <a:cs typeface="+mn-cs"/>
         </a:defRPr>
       </a:lvl4pPr>
-      <a:lvl5pPr marL="2057400" indent="-228600" algn="l" defTabSz="914400" rtl="0" eaLnBrk="1" latinLnBrk="0" hangingPunct="1">
+      <a:lvl5pPr marL="2057349" indent="-228594" algn="l" defTabSz="914377" rtl="0" eaLnBrk="1" latinLnBrk="0" hangingPunct="1">
         <a:lnSpc>
           <a:spcPct val="90000"/>
         </a:lnSpc>
@@ -3147,7 +3152,7 @@
           <a:cs typeface="+mn-cs"/>
         </a:defRPr>
       </a:lvl5pPr>
-      <a:lvl6pPr marL="2514600" indent="-228600" algn="l" defTabSz="914400" rtl="0" eaLnBrk="1" latinLnBrk="0" hangingPunct="1">
+      <a:lvl6pPr marL="2514537" indent="-228594" algn="l" defTabSz="914377" rtl="0" eaLnBrk="1" latinLnBrk="0" hangingPunct="1">
         <a:lnSpc>
           <a:spcPct val="90000"/>
         </a:lnSpc>
@@ -3165,7 +3170,7 @@
           <a:cs typeface="+mn-cs"/>
         </a:defRPr>
       </a:lvl6pPr>
-      <a:lvl7pPr marL="2971800" indent="-228600" algn="l" defTabSz="914400" rtl="0" eaLnBrk="1" latinLnBrk="0" hangingPunct="1">
+      <a:lvl7pPr marL="2971726" indent="-228594" algn="l" defTabSz="914377" rtl="0" eaLnBrk="1" latinLnBrk="0" hangingPunct="1">
         <a:lnSpc>
           <a:spcPct val="90000"/>
         </a:lnSpc>
@@ -3183,7 +3188,7 @@
           <a:cs typeface="+mn-cs"/>
         </a:defRPr>
       </a:lvl7pPr>
-      <a:lvl8pPr marL="3429000" indent="-228600" algn="l" defTabSz="914400" rtl="0" eaLnBrk="1" latinLnBrk="0" hangingPunct="1">
+      <a:lvl8pPr marL="3428914" indent="-228594" algn="l" defTabSz="914377" rtl="0" eaLnBrk="1" latinLnBrk="0" hangingPunct="1">
         <a:lnSpc>
           <a:spcPct val="90000"/>
         </a:lnSpc>
@@ -3201,7 +3206,7 @@
           <a:cs typeface="+mn-cs"/>
         </a:defRPr>
       </a:lvl8pPr>
-      <a:lvl9pPr marL="3886200" indent="-228600" algn="l" defTabSz="914400" rtl="0" eaLnBrk="1" latinLnBrk="0" hangingPunct="1">
+      <a:lvl9pPr marL="3886103" indent="-228594" algn="l" defTabSz="914377" rtl="0" eaLnBrk="1" latinLnBrk="0" hangingPunct="1">
         <a:lnSpc>
           <a:spcPct val="90000"/>
         </a:lnSpc>
@@ -3224,7 +3229,7 @@
       <a:defPPr>
         <a:defRPr lang="en-US"/>
       </a:defPPr>
-      <a:lvl1pPr marL="0" algn="l" defTabSz="914400" rtl="0" eaLnBrk="1" latinLnBrk="0" hangingPunct="1">
+      <a:lvl1pPr marL="0" algn="l" defTabSz="914377" rtl="0" eaLnBrk="1" latinLnBrk="0" hangingPunct="1">
         <a:defRPr sz="1800" kern="1200">
           <a:solidFill>
             <a:schemeClr val="tx1"/>
@@ -3234,7 +3239,7 @@
           <a:cs typeface="+mn-cs"/>
         </a:defRPr>
       </a:lvl1pPr>
-      <a:lvl2pPr marL="457200" algn="l" defTabSz="914400" rtl="0" eaLnBrk="1" latinLnBrk="0" hangingPunct="1">
+      <a:lvl2pPr marL="457189" algn="l" defTabSz="914377" rtl="0" eaLnBrk="1" latinLnBrk="0" hangingPunct="1">
         <a:defRPr sz="1800" kern="1200">
           <a:solidFill>
             <a:schemeClr val="tx1"/>
@@ -3244,7 +3249,7 @@
           <a:cs typeface="+mn-cs"/>
         </a:defRPr>
       </a:lvl2pPr>
-      <a:lvl3pPr marL="914400" algn="l" defTabSz="914400" rtl="0" eaLnBrk="1" latinLnBrk="0" hangingPunct="1">
+      <a:lvl3pPr marL="914377" algn="l" defTabSz="914377" rtl="0" eaLnBrk="1" latinLnBrk="0" hangingPunct="1">
         <a:defRPr sz="1800" kern="1200">
           <a:solidFill>
             <a:schemeClr val="tx1"/>
@@ -3254,7 +3259,7 @@
           <a:cs typeface="+mn-cs"/>
         </a:defRPr>
       </a:lvl3pPr>
-      <a:lvl4pPr marL="1371600" algn="l" defTabSz="914400" rtl="0" eaLnBrk="1" latinLnBrk="0" hangingPunct="1">
+      <a:lvl4pPr marL="1371566" algn="l" defTabSz="914377" rtl="0" eaLnBrk="1" latinLnBrk="0" hangingPunct="1">
         <a:defRPr sz="1800" kern="1200">
           <a:solidFill>
             <a:schemeClr val="tx1"/>
@@ -3264,7 +3269,7 @@
           <a:cs typeface="+mn-cs"/>
         </a:defRPr>
       </a:lvl4pPr>
-      <a:lvl5pPr marL="1828800" algn="l" defTabSz="914400" rtl="0" eaLnBrk="1" latinLnBrk="0" hangingPunct="1">
+      <a:lvl5pPr marL="1828754" algn="l" defTabSz="914377" rtl="0" eaLnBrk="1" latinLnBrk="0" hangingPunct="1">
         <a:defRPr sz="1800" kern="1200">
           <a:solidFill>
             <a:schemeClr val="tx1"/>
@@ -3274,7 +3279,7 @@
           <a:cs typeface="+mn-cs"/>
         </a:defRPr>
       </a:lvl5pPr>
-      <a:lvl6pPr marL="2286000" algn="l" defTabSz="914400" rtl="0" eaLnBrk="1" latinLnBrk="0" hangingPunct="1">
+      <a:lvl6pPr marL="2285943" algn="l" defTabSz="914377" rtl="0" eaLnBrk="1" latinLnBrk="0" hangingPunct="1">
         <a:defRPr sz="1800" kern="1200">
           <a:solidFill>
             <a:schemeClr val="tx1"/>
@@ -3284,7 +3289,7 @@
           <a:cs typeface="+mn-cs"/>
         </a:defRPr>
       </a:lvl6pPr>
-      <a:lvl7pPr marL="2743200" algn="l" defTabSz="914400" rtl="0" eaLnBrk="1" latinLnBrk="0" hangingPunct="1">
+      <a:lvl7pPr marL="2743131" algn="l" defTabSz="914377" rtl="0" eaLnBrk="1" latinLnBrk="0" hangingPunct="1">
         <a:defRPr sz="1800" kern="1200">
           <a:solidFill>
             <a:schemeClr val="tx1"/>
@@ -3294,7 +3299,7 @@
           <a:cs typeface="+mn-cs"/>
         </a:defRPr>
       </a:lvl7pPr>
-      <a:lvl8pPr marL="3200400" algn="l" defTabSz="914400" rtl="0" eaLnBrk="1" latinLnBrk="0" hangingPunct="1">
+      <a:lvl8pPr marL="3200320" algn="l" defTabSz="914377" rtl="0" eaLnBrk="1" latinLnBrk="0" hangingPunct="1">
         <a:defRPr sz="1800" kern="1200">
           <a:solidFill>
             <a:schemeClr val="tx1"/>
@@ -3304,7 +3309,7 @@
           <a:cs typeface="+mn-cs"/>
         </a:defRPr>
       </a:lvl8pPr>
-      <a:lvl9pPr marL="3657600" algn="l" defTabSz="914400" rtl="0" eaLnBrk="1" latinLnBrk="0" hangingPunct="1">
+      <a:lvl9pPr marL="3657509" algn="l" defTabSz="914377" rtl="0" eaLnBrk="1" latinLnBrk="0" hangingPunct="1">
         <a:defRPr sz="1800" kern="1200">
           <a:solidFill>
             <a:schemeClr val="tx1"/>
@@ -3363,7 +3368,7 @@
         </p:blipFill>
         <p:spPr>
           <a:xfrm>
-            <a:off x="-1" y="321276"/>
+            <a:off x="-1" y="298622"/>
             <a:ext cx="12192001" cy="6343135"/>
           </a:xfrm>
           <a:prstGeom prst="rect">
@@ -3385,7 +3390,7 @@
         </p:nvSpPr>
         <p:spPr>
           <a:xfrm>
-            <a:off x="7965988" y="3998329"/>
+            <a:off x="7965989" y="3998330"/>
             <a:ext cx="1359243" cy="307777"/>
           </a:xfrm>
           <a:prstGeom prst="rect">
@@ -3427,8 +3432,8 @@
         </p:nvSpPr>
         <p:spPr>
           <a:xfrm>
-            <a:off x="6660292" y="2859671"/>
-            <a:ext cx="1684638" cy="307777"/>
+            <a:off x="6660293" y="2859672"/>
+            <a:ext cx="1684639" cy="307777"/>
           </a:xfrm>
           <a:prstGeom prst="rect">
             <a:avLst/>
@@ -3488,7 +3493,7 @@
     </p:spTree>
     <p:extLst>
       <p:ext uri="{BB962C8B-B14F-4D97-AF65-F5344CB8AC3E}">
-        <p14:creationId xmlns:p14="http://schemas.microsoft.com/office/powerpoint/2010/main" val="3584881541"/>
+        <p14:creationId xmlns:p14="http://schemas.microsoft.com/office/powerpoint/2010/main" val="2168909197"/>
       </p:ext>
     </p:extLst>
   </p:cSld>
@@ -3515,10 +3520,160 @@
           <a:chExt cx="0" cy="0"/>
         </a:xfrm>
       </p:grpSpPr>
+      <p:pic>
+        <p:nvPicPr>
+          <p:cNvPr id="3" name="Picture 2">
+            <a:extLst>
+              <a:ext uri="{FF2B5EF4-FFF2-40B4-BE49-F238E27FC236}">
+                <a16:creationId xmlns:a16="http://schemas.microsoft.com/office/drawing/2014/main" id="{A3726A74-4AE5-49EA-B32A-D8201D9A86A9}"/>
+              </a:ext>
+            </a:extLst>
+          </p:cNvPr>
+          <p:cNvPicPr>
+            <a:picLocks noChangeAspect="1"/>
+          </p:cNvPicPr>
+          <p:nvPr/>
+        </p:nvPicPr>
+        <p:blipFill>
+          <a:blip r:embed="rId2">
+            <a:extLst>
+              <a:ext uri="{28A0092B-C50C-407E-A947-70E740481C1C}">
+                <a14:useLocalDpi xmlns:a14="http://schemas.microsoft.com/office/drawing/2010/main" val="0"/>
+              </a:ext>
+            </a:extLst>
+          </a:blip>
+          <a:stretch>
+            <a:fillRect/>
+          </a:stretch>
+        </p:blipFill>
+        <p:spPr>
+          <a:xfrm>
+            <a:off x="668693" y="1148913"/>
+            <a:ext cx="5104602" cy="4000000"/>
+          </a:xfrm>
+          <a:prstGeom prst="rect">
+            <a:avLst/>
+          </a:prstGeom>
+        </p:spPr>
+      </p:pic>
+      <p:pic>
+        <p:nvPicPr>
+          <p:cNvPr id="4" name="Picture 3">
+            <a:extLst>
+              <a:ext uri="{FF2B5EF4-FFF2-40B4-BE49-F238E27FC236}">
+                <a16:creationId xmlns:a16="http://schemas.microsoft.com/office/drawing/2014/main" id="{82EACD92-B958-4DA2-9B5E-490D8E3D130D}"/>
+              </a:ext>
+            </a:extLst>
+          </p:cNvPr>
+          <p:cNvPicPr>
+            <a:picLocks noChangeAspect="1"/>
+          </p:cNvPicPr>
+          <p:nvPr/>
+        </p:nvPicPr>
+        <p:blipFill>
+          <a:blip r:embed="rId3">
+            <a:extLst>
+              <a:ext uri="{28A0092B-C50C-407E-A947-70E740481C1C}">
+                <a14:useLocalDpi xmlns:a14="http://schemas.microsoft.com/office/drawing/2010/main" val="0"/>
+              </a:ext>
+            </a:extLst>
+          </a:blip>
+          <a:stretch>
+            <a:fillRect/>
+          </a:stretch>
+        </p:blipFill>
+        <p:spPr>
+          <a:xfrm>
+            <a:off x="6096000" y="1148913"/>
+            <a:ext cx="5333333" cy="4000000"/>
+          </a:xfrm>
+          <a:prstGeom prst="rect">
+            <a:avLst/>
+          </a:prstGeom>
+        </p:spPr>
+      </p:pic>
+      <p:sp>
+        <p:nvSpPr>
+          <p:cNvPr id="5" name="TextBox 4">
+            <a:extLst>
+              <a:ext uri="{FF2B5EF4-FFF2-40B4-BE49-F238E27FC236}">
+                <a16:creationId xmlns:a16="http://schemas.microsoft.com/office/drawing/2014/main" id="{00CB6278-13E2-4D70-B5F2-E77561B8D74C}"/>
+              </a:ext>
+            </a:extLst>
+          </p:cNvPr>
+          <p:cNvSpPr txBox="1"/>
+          <p:nvPr/>
+        </p:nvSpPr>
+        <p:spPr>
+          <a:xfrm>
+            <a:off x="1449859" y="4995025"/>
+            <a:ext cx="2743200" cy="307777"/>
+          </a:xfrm>
+          <a:prstGeom prst="rect">
+            <a:avLst/>
+          </a:prstGeom>
+          <a:noFill/>
+        </p:spPr>
+        <p:txBody>
+          <a:bodyPr wrap="square" rtlCol="0">
+            <a:spAutoFit/>
+          </a:bodyPr>
+          <a:lstStyle/>
+          <a:p>
+            <a:pPr algn="ctr"/>
+            <a:r>
+              <a:rPr lang="en-US" sz="1400" dirty="0">
+                <a:latin typeface="Arial" panose="020B0604020202020204" pitchFamily="34" charset="0"/>
+                <a:cs typeface="Arial" panose="020B0604020202020204" pitchFamily="34" charset="0"/>
+              </a:rPr>
+              <a:t>(A) First Level Results</a:t>
+            </a:r>
+          </a:p>
+        </p:txBody>
+      </p:sp>
+      <p:sp>
+        <p:nvSpPr>
+          <p:cNvPr id="6" name="TextBox 5">
+            <a:extLst>
+              <a:ext uri="{FF2B5EF4-FFF2-40B4-BE49-F238E27FC236}">
+                <a16:creationId xmlns:a16="http://schemas.microsoft.com/office/drawing/2014/main" id="{DFCC3576-3826-44E6-AD4D-F0F0CC66810B}"/>
+              </a:ext>
+            </a:extLst>
+          </p:cNvPr>
+          <p:cNvSpPr txBox="1"/>
+          <p:nvPr/>
+        </p:nvSpPr>
+        <p:spPr>
+          <a:xfrm>
+            <a:off x="6874475" y="4995024"/>
+            <a:ext cx="2743200" cy="307777"/>
+          </a:xfrm>
+          <a:prstGeom prst="rect">
+            <a:avLst/>
+          </a:prstGeom>
+          <a:noFill/>
+        </p:spPr>
+        <p:txBody>
+          <a:bodyPr wrap="square" rtlCol="0">
+            <a:spAutoFit/>
+          </a:bodyPr>
+          <a:lstStyle/>
+          <a:p>
+            <a:pPr algn="ctr"/>
+            <a:r>
+              <a:rPr lang="en-US" sz="1400" dirty="0">
+                <a:latin typeface="Arial" panose="020B0604020202020204" pitchFamily="34" charset="0"/>
+                <a:cs typeface="Arial" panose="020B0604020202020204" pitchFamily="34" charset="0"/>
+              </a:rPr>
+              <a:t>(B) Second Level Results</a:t>
+            </a:r>
+          </a:p>
+        </p:txBody>
+      </p:sp>
     </p:spTree>
     <p:extLst>
       <p:ext uri="{BB962C8B-B14F-4D97-AF65-F5344CB8AC3E}">
-        <p14:creationId xmlns:p14="http://schemas.microsoft.com/office/powerpoint/2010/main" val="2168909197"/>
+        <p14:creationId xmlns:p14="http://schemas.microsoft.com/office/powerpoint/2010/main" val="894744456"/>
       </p:ext>
     </p:extLst>
   </p:cSld>
@@ -3695,10 +3850,1054 @@
           <a:chExt cx="0" cy="0"/>
         </a:xfrm>
       </p:grpSpPr>
+      <p:sp>
+        <p:nvSpPr>
+          <p:cNvPr id="2" name="Parallelogram 1">
+            <a:extLst>
+              <a:ext uri="{FF2B5EF4-FFF2-40B4-BE49-F238E27FC236}">
+                <a16:creationId xmlns:a16="http://schemas.microsoft.com/office/drawing/2014/main" id="{AF5F9F3D-F3E6-48C9-AEF4-1E2148C739E6}"/>
+              </a:ext>
+            </a:extLst>
+          </p:cNvPr>
+          <p:cNvSpPr/>
+          <p:nvPr/>
+        </p:nvSpPr>
+        <p:spPr>
+          <a:xfrm>
+            <a:off x="861060" y="586740"/>
+            <a:ext cx="1432560" cy="518160"/>
+          </a:xfrm>
+          <a:prstGeom prst="parallelogram">
+            <a:avLst/>
+          </a:prstGeom>
+          <a:solidFill>
+            <a:schemeClr val="accent2">
+              <a:lumMod val="75000"/>
+            </a:schemeClr>
+          </a:solidFill>
+        </p:spPr>
+        <p:style>
+          <a:lnRef idx="2">
+            <a:schemeClr val="accent2">
+              <a:shade val="50000"/>
+            </a:schemeClr>
+          </a:lnRef>
+          <a:fillRef idx="1">
+            <a:schemeClr val="accent2"/>
+          </a:fillRef>
+          <a:effectRef idx="0">
+            <a:schemeClr val="accent2"/>
+          </a:effectRef>
+          <a:fontRef idx="minor">
+            <a:schemeClr val="lt1"/>
+          </a:fontRef>
+        </p:style>
+        <p:txBody>
+          <a:bodyPr rot="0" spcFirstLastPara="0" vertOverflow="overflow" horzOverflow="overflow" vert="horz" wrap="square" lIns="91440" tIns="45720" rIns="91440" bIns="45720" numCol="1" spcCol="0" rtlCol="0" fromWordArt="0" anchor="ctr" anchorCtr="0" forceAA="0" compatLnSpc="1">
+            <a:prstTxWarp prst="textNoShape">
+              <a:avLst/>
+            </a:prstTxWarp>
+            <a:noAutofit/>
+          </a:bodyPr>
+          <a:lstStyle/>
+          <a:p>
+            <a:pPr algn="ctr"/>
+            <a:r>
+              <a:rPr lang="en-US" dirty="0">
+                <a:solidFill>
+                  <a:schemeClr val="bg1"/>
+                </a:solidFill>
+                <a:latin typeface="Arial" panose="020B0604020202020204" pitchFamily="34" charset="0"/>
+                <a:cs typeface="Arial" panose="020B0604020202020204" pitchFamily="34" charset="0"/>
+              </a:rPr>
+              <a:t>STL File</a:t>
+            </a:r>
+          </a:p>
+        </p:txBody>
+      </p:sp>
+      <p:sp>
+        <p:nvSpPr>
+          <p:cNvPr id="3" name="Parallelogram 2">
+            <a:extLst>
+              <a:ext uri="{FF2B5EF4-FFF2-40B4-BE49-F238E27FC236}">
+                <a16:creationId xmlns:a16="http://schemas.microsoft.com/office/drawing/2014/main" id="{EC53A885-21FC-451F-BC91-8A1B309354B4}"/>
+              </a:ext>
+            </a:extLst>
+          </p:cNvPr>
+          <p:cNvSpPr/>
+          <p:nvPr/>
+        </p:nvSpPr>
+        <p:spPr>
+          <a:xfrm>
+            <a:off x="861060" y="6012180"/>
+            <a:ext cx="1432560" cy="518160"/>
+          </a:xfrm>
+          <a:prstGeom prst="parallelogram">
+            <a:avLst/>
+          </a:prstGeom>
+          <a:solidFill>
+            <a:schemeClr val="accent2">
+              <a:lumMod val="75000"/>
+            </a:schemeClr>
+          </a:solidFill>
+        </p:spPr>
+        <p:style>
+          <a:lnRef idx="2">
+            <a:schemeClr val="accent2">
+              <a:shade val="50000"/>
+            </a:schemeClr>
+          </a:lnRef>
+          <a:fillRef idx="1">
+            <a:schemeClr val="accent2"/>
+          </a:fillRef>
+          <a:effectRef idx="0">
+            <a:schemeClr val="accent2"/>
+          </a:effectRef>
+          <a:fontRef idx="minor">
+            <a:schemeClr val="lt1"/>
+          </a:fontRef>
+        </p:style>
+        <p:txBody>
+          <a:bodyPr rot="0" spcFirstLastPara="0" vertOverflow="overflow" horzOverflow="overflow" vert="horz" wrap="square" lIns="91440" tIns="45720" rIns="91440" bIns="45720" numCol="1" spcCol="0" rtlCol="0" fromWordArt="0" anchor="ctr" anchorCtr="0" forceAA="0" compatLnSpc="1">
+            <a:prstTxWarp prst="textNoShape">
+              <a:avLst/>
+            </a:prstTxWarp>
+            <a:noAutofit/>
+          </a:bodyPr>
+          <a:lstStyle/>
+          <a:p>
+            <a:pPr algn="ctr"/>
+            <a:r>
+              <a:rPr lang="en-US" sz="1100" dirty="0">
+                <a:solidFill>
+                  <a:schemeClr val="bg1"/>
+                </a:solidFill>
+                <a:latin typeface="Arial" panose="020B0604020202020204" pitchFamily="34" charset="0"/>
+                <a:cs typeface="Arial" panose="020B0604020202020204" pitchFamily="34" charset="0"/>
+              </a:rPr>
+              <a:t>Printing Using Multiple Robots</a:t>
+            </a:r>
+          </a:p>
+        </p:txBody>
+      </p:sp>
+      <p:sp>
+        <p:nvSpPr>
+          <p:cNvPr id="4" name="Rectangle 3">
+            <a:extLst>
+              <a:ext uri="{FF2B5EF4-FFF2-40B4-BE49-F238E27FC236}">
+                <a16:creationId xmlns:a16="http://schemas.microsoft.com/office/drawing/2014/main" id="{E6E845BB-0149-485E-B4B2-36DFAC87415F}"/>
+              </a:ext>
+            </a:extLst>
+          </p:cNvPr>
+          <p:cNvSpPr/>
+          <p:nvPr/>
+        </p:nvSpPr>
+        <p:spPr>
+          <a:xfrm>
+            <a:off x="4663440" y="1310015"/>
+            <a:ext cx="1432560" cy="403860"/>
+          </a:xfrm>
+          <a:prstGeom prst="rect">
+            <a:avLst/>
+          </a:prstGeom>
+        </p:spPr>
+        <p:style>
+          <a:lnRef idx="2">
+            <a:schemeClr val="accent3">
+              <a:shade val="50000"/>
+            </a:schemeClr>
+          </a:lnRef>
+          <a:fillRef idx="1">
+            <a:schemeClr val="accent3"/>
+          </a:fillRef>
+          <a:effectRef idx="0">
+            <a:schemeClr val="accent3"/>
+          </a:effectRef>
+          <a:fontRef idx="minor">
+            <a:schemeClr val="lt1"/>
+          </a:fontRef>
+        </p:style>
+        <p:txBody>
+          <a:bodyPr rot="0" spcFirstLastPara="0" vertOverflow="overflow" horzOverflow="overflow" vert="horz" wrap="square" lIns="91440" tIns="45720" rIns="91440" bIns="45720" numCol="1" spcCol="0" rtlCol="0" fromWordArt="0" anchor="ctr" anchorCtr="0" forceAA="0" compatLnSpc="1">
+            <a:prstTxWarp prst="textNoShape">
+              <a:avLst/>
+            </a:prstTxWarp>
+            <a:noAutofit/>
+          </a:bodyPr>
+          <a:lstStyle/>
+          <a:p>
+            <a:pPr algn="ctr"/>
+            <a:r>
+              <a:rPr lang="en-US" sz="1400" dirty="0">
+                <a:latin typeface="Arial" panose="020B0604020202020204" pitchFamily="34" charset="0"/>
+                <a:cs typeface="Arial" panose="020B0604020202020204" pitchFamily="34" charset="0"/>
+              </a:rPr>
+              <a:t>Chunking</a:t>
+            </a:r>
+            <a:endParaRPr lang="en-US" dirty="0">
+              <a:latin typeface="Arial" panose="020B0604020202020204" pitchFamily="34" charset="0"/>
+              <a:cs typeface="Arial" panose="020B0604020202020204" pitchFamily="34" charset="0"/>
+            </a:endParaRPr>
+          </a:p>
+        </p:txBody>
+      </p:sp>
+      <p:sp>
+        <p:nvSpPr>
+          <p:cNvPr id="5" name="Rectangle 4">
+            <a:extLst>
+              <a:ext uri="{FF2B5EF4-FFF2-40B4-BE49-F238E27FC236}">
+                <a16:creationId xmlns:a16="http://schemas.microsoft.com/office/drawing/2014/main" id="{FD52C92F-5444-4F10-9576-E9C77DE50BFD}"/>
+              </a:ext>
+            </a:extLst>
+          </p:cNvPr>
+          <p:cNvSpPr/>
+          <p:nvPr/>
+        </p:nvSpPr>
+        <p:spPr>
+          <a:xfrm>
+            <a:off x="4663440" y="2317759"/>
+            <a:ext cx="1432560" cy="403860"/>
+          </a:xfrm>
+          <a:prstGeom prst="rect">
+            <a:avLst/>
+          </a:prstGeom>
+          <a:solidFill>
+            <a:srgbClr val="C00000"/>
+          </a:solidFill>
+        </p:spPr>
+        <p:style>
+          <a:lnRef idx="2">
+            <a:schemeClr val="accent3">
+              <a:shade val="50000"/>
+            </a:schemeClr>
+          </a:lnRef>
+          <a:fillRef idx="1">
+            <a:schemeClr val="accent3"/>
+          </a:fillRef>
+          <a:effectRef idx="0">
+            <a:schemeClr val="accent3"/>
+          </a:effectRef>
+          <a:fontRef idx="minor">
+            <a:schemeClr val="lt1"/>
+          </a:fontRef>
+        </p:style>
+        <p:txBody>
+          <a:bodyPr rot="0" spcFirstLastPara="0" vertOverflow="overflow" horzOverflow="overflow" vert="horz" wrap="square" lIns="91440" tIns="45720" rIns="91440" bIns="45720" numCol="1" spcCol="0" rtlCol="0" fromWordArt="0" anchor="ctr" anchorCtr="0" forceAA="0" compatLnSpc="1">
+            <a:prstTxWarp prst="textNoShape">
+              <a:avLst/>
+            </a:prstTxWarp>
+            <a:noAutofit/>
+          </a:bodyPr>
+          <a:lstStyle/>
+          <a:p>
+            <a:pPr algn="ctr"/>
+            <a:r>
+              <a:rPr lang="en-US" dirty="0">
+                <a:latin typeface="Arial" panose="020B0604020202020204" pitchFamily="34" charset="0"/>
+                <a:cs typeface="Arial" panose="020B0604020202020204" pitchFamily="34" charset="0"/>
+              </a:rPr>
+              <a:t>Placing</a:t>
+            </a:r>
+          </a:p>
+        </p:txBody>
+      </p:sp>
+      <p:sp>
+        <p:nvSpPr>
+          <p:cNvPr id="6" name="Rectangle 5">
+            <a:extLst>
+              <a:ext uri="{FF2B5EF4-FFF2-40B4-BE49-F238E27FC236}">
+                <a16:creationId xmlns:a16="http://schemas.microsoft.com/office/drawing/2014/main" id="{8AAFEE65-8511-4AF1-B875-5300BE2925F4}"/>
+              </a:ext>
+            </a:extLst>
+          </p:cNvPr>
+          <p:cNvSpPr/>
+          <p:nvPr/>
+        </p:nvSpPr>
+        <p:spPr>
+          <a:xfrm>
+            <a:off x="4663440" y="3325503"/>
+            <a:ext cx="1432560" cy="403860"/>
+          </a:xfrm>
+          <a:prstGeom prst="rect">
+            <a:avLst/>
+          </a:prstGeom>
+        </p:spPr>
+        <p:style>
+          <a:lnRef idx="2">
+            <a:schemeClr val="accent3">
+              <a:shade val="50000"/>
+            </a:schemeClr>
+          </a:lnRef>
+          <a:fillRef idx="1">
+            <a:schemeClr val="accent3"/>
+          </a:fillRef>
+          <a:effectRef idx="0">
+            <a:schemeClr val="accent3"/>
+          </a:effectRef>
+          <a:fontRef idx="minor">
+            <a:schemeClr val="lt1"/>
+          </a:fontRef>
+        </p:style>
+        <p:txBody>
+          <a:bodyPr rot="0" spcFirstLastPara="0" vertOverflow="overflow" horzOverflow="overflow" vert="horz" wrap="square" lIns="91440" tIns="45720" rIns="91440" bIns="45720" numCol="1" spcCol="0" rtlCol="0" fromWordArt="0" anchor="ctr" anchorCtr="0" forceAA="0" compatLnSpc="1">
+            <a:prstTxWarp prst="textNoShape">
+              <a:avLst/>
+            </a:prstTxWarp>
+            <a:noAutofit/>
+          </a:bodyPr>
+          <a:lstStyle/>
+          <a:p>
+            <a:pPr algn="ctr"/>
+            <a:r>
+              <a:rPr lang="en-US" sz="1400" dirty="0">
+                <a:latin typeface="Arial" panose="020B0604020202020204" pitchFamily="34" charset="0"/>
+                <a:cs typeface="Arial" panose="020B0604020202020204" pitchFamily="34" charset="0"/>
+              </a:rPr>
+              <a:t>Scheduling</a:t>
+            </a:r>
+            <a:endParaRPr lang="en-US" dirty="0">
+              <a:latin typeface="Arial" panose="020B0604020202020204" pitchFamily="34" charset="0"/>
+              <a:cs typeface="Arial" panose="020B0604020202020204" pitchFamily="34" charset="0"/>
+            </a:endParaRPr>
+          </a:p>
+        </p:txBody>
+      </p:sp>
+      <p:sp>
+        <p:nvSpPr>
+          <p:cNvPr id="7" name="Rectangle 6">
+            <a:extLst>
+              <a:ext uri="{FF2B5EF4-FFF2-40B4-BE49-F238E27FC236}">
+                <a16:creationId xmlns:a16="http://schemas.microsoft.com/office/drawing/2014/main" id="{EE38B6D4-71EF-4196-AB9F-FFADAEF1D89F}"/>
+              </a:ext>
+            </a:extLst>
+          </p:cNvPr>
+          <p:cNvSpPr/>
+          <p:nvPr/>
+        </p:nvSpPr>
+        <p:spPr>
+          <a:xfrm>
+            <a:off x="4663440" y="4333247"/>
+            <a:ext cx="1432560" cy="403860"/>
+          </a:xfrm>
+          <a:prstGeom prst="rect">
+            <a:avLst/>
+          </a:prstGeom>
+        </p:spPr>
+        <p:style>
+          <a:lnRef idx="2">
+            <a:schemeClr val="accent3">
+              <a:shade val="50000"/>
+            </a:schemeClr>
+          </a:lnRef>
+          <a:fillRef idx="1">
+            <a:schemeClr val="accent3"/>
+          </a:fillRef>
+          <a:effectRef idx="0">
+            <a:schemeClr val="accent3"/>
+          </a:effectRef>
+          <a:fontRef idx="minor">
+            <a:schemeClr val="lt1"/>
+          </a:fontRef>
+        </p:style>
+        <p:txBody>
+          <a:bodyPr rot="0" spcFirstLastPara="0" vertOverflow="overflow" horzOverflow="overflow" vert="horz" wrap="square" lIns="91440" tIns="45720" rIns="91440" bIns="45720" numCol="1" spcCol="0" rtlCol="0" fromWordArt="0" anchor="ctr" anchorCtr="0" forceAA="0" compatLnSpc="1">
+            <a:prstTxWarp prst="textNoShape">
+              <a:avLst/>
+            </a:prstTxWarp>
+            <a:noAutofit/>
+          </a:bodyPr>
+          <a:lstStyle/>
+          <a:p>
+            <a:pPr algn="ctr"/>
+            <a:r>
+              <a:rPr lang="en-US" sz="1400" dirty="0">
+                <a:latin typeface="Arial" panose="020B0604020202020204" pitchFamily="34" charset="0"/>
+                <a:cs typeface="Arial" panose="020B0604020202020204" pitchFamily="34" charset="0"/>
+              </a:rPr>
+              <a:t>Path Planning</a:t>
+            </a:r>
+          </a:p>
+        </p:txBody>
+      </p:sp>
+      <p:sp>
+        <p:nvSpPr>
+          <p:cNvPr id="8" name="Rectangle 7">
+            <a:extLst>
+              <a:ext uri="{FF2B5EF4-FFF2-40B4-BE49-F238E27FC236}">
+                <a16:creationId xmlns:a16="http://schemas.microsoft.com/office/drawing/2014/main" id="{75DEF021-72ED-4127-9F4B-4BFD052B863F}"/>
+              </a:ext>
+            </a:extLst>
+          </p:cNvPr>
+          <p:cNvSpPr/>
+          <p:nvPr/>
+        </p:nvSpPr>
+        <p:spPr>
+          <a:xfrm>
+            <a:off x="4663440" y="5340991"/>
+            <a:ext cx="1432560" cy="403860"/>
+          </a:xfrm>
+          <a:prstGeom prst="rect">
+            <a:avLst/>
+          </a:prstGeom>
+        </p:spPr>
+        <p:style>
+          <a:lnRef idx="2">
+            <a:schemeClr val="accent3">
+              <a:shade val="50000"/>
+            </a:schemeClr>
+          </a:lnRef>
+          <a:fillRef idx="1">
+            <a:schemeClr val="accent3"/>
+          </a:fillRef>
+          <a:effectRef idx="0">
+            <a:schemeClr val="accent3"/>
+          </a:effectRef>
+          <a:fontRef idx="minor">
+            <a:schemeClr val="lt1"/>
+          </a:fontRef>
+        </p:style>
+        <p:txBody>
+          <a:bodyPr rot="0" spcFirstLastPara="0" vertOverflow="overflow" horzOverflow="overflow" vert="horz" wrap="square" lIns="91440" tIns="45720" rIns="91440" bIns="45720" numCol="1" spcCol="0" rtlCol="0" fromWordArt="0" anchor="ctr" anchorCtr="0" forceAA="0" compatLnSpc="1">
+            <a:prstTxWarp prst="textNoShape">
+              <a:avLst/>
+            </a:prstTxWarp>
+            <a:noAutofit/>
+          </a:bodyPr>
+          <a:lstStyle/>
+          <a:p>
+            <a:pPr algn="ctr"/>
+            <a:r>
+              <a:rPr lang="en-US" sz="1400" dirty="0">
+                <a:latin typeface="Arial" panose="020B0604020202020204" pitchFamily="34" charset="0"/>
+                <a:cs typeface="Arial" panose="020B0604020202020204" pitchFamily="34" charset="0"/>
+              </a:rPr>
+              <a:t>Slicing</a:t>
+            </a:r>
+          </a:p>
+        </p:txBody>
+      </p:sp>
+      <p:cxnSp>
+        <p:nvCxnSpPr>
+          <p:cNvPr id="12" name="Straight Arrow Connector 11">
+            <a:extLst>
+              <a:ext uri="{FF2B5EF4-FFF2-40B4-BE49-F238E27FC236}">
+                <a16:creationId xmlns:a16="http://schemas.microsoft.com/office/drawing/2014/main" id="{108C26B5-F262-40B0-8617-835C8D7B8E8C}"/>
+              </a:ext>
+            </a:extLst>
+          </p:cNvPr>
+          <p:cNvCxnSpPr>
+            <a:stCxn id="4" idx="2"/>
+            <a:endCxn id="5" idx="0"/>
+          </p:cNvCxnSpPr>
+          <p:nvPr/>
+        </p:nvCxnSpPr>
+        <p:spPr>
+          <a:xfrm>
+            <a:off x="5379720" y="1713875"/>
+            <a:ext cx="0" cy="603884"/>
+          </a:xfrm>
+          <a:prstGeom prst="straightConnector1">
+            <a:avLst/>
+          </a:prstGeom>
+          <a:ln>
+            <a:headEnd type="triangle" w="med" len="med"/>
+            <a:tailEnd type="triangle" w="med" len="med"/>
+          </a:ln>
+        </p:spPr>
+        <p:style>
+          <a:lnRef idx="1">
+            <a:schemeClr val="dk1"/>
+          </a:lnRef>
+          <a:fillRef idx="0">
+            <a:schemeClr val="dk1"/>
+          </a:fillRef>
+          <a:effectRef idx="0">
+            <a:schemeClr val="dk1"/>
+          </a:effectRef>
+          <a:fontRef idx="minor">
+            <a:schemeClr val="tx1"/>
+          </a:fontRef>
+        </p:style>
+      </p:cxnSp>
+      <p:cxnSp>
+        <p:nvCxnSpPr>
+          <p:cNvPr id="14" name="Straight Arrow Connector 13">
+            <a:extLst>
+              <a:ext uri="{FF2B5EF4-FFF2-40B4-BE49-F238E27FC236}">
+                <a16:creationId xmlns:a16="http://schemas.microsoft.com/office/drawing/2014/main" id="{6B0EA927-57B7-4BC3-9C1D-41B69AE202FD}"/>
+              </a:ext>
+            </a:extLst>
+          </p:cNvPr>
+          <p:cNvCxnSpPr>
+            <a:stCxn id="5" idx="2"/>
+            <a:endCxn id="6" idx="0"/>
+          </p:cNvCxnSpPr>
+          <p:nvPr/>
+        </p:nvCxnSpPr>
+        <p:spPr>
+          <a:xfrm>
+            <a:off x="5379720" y="2721619"/>
+            <a:ext cx="0" cy="603884"/>
+          </a:xfrm>
+          <a:prstGeom prst="straightConnector1">
+            <a:avLst/>
+          </a:prstGeom>
+          <a:ln>
+            <a:headEnd type="triangle" w="med" len="med"/>
+            <a:tailEnd type="triangle" w="med" len="med"/>
+          </a:ln>
+        </p:spPr>
+        <p:style>
+          <a:lnRef idx="1">
+            <a:schemeClr val="dk1"/>
+          </a:lnRef>
+          <a:fillRef idx="0">
+            <a:schemeClr val="dk1"/>
+          </a:fillRef>
+          <a:effectRef idx="0">
+            <a:schemeClr val="dk1"/>
+          </a:effectRef>
+          <a:fontRef idx="minor">
+            <a:schemeClr val="tx1"/>
+          </a:fontRef>
+        </p:style>
+      </p:cxnSp>
+      <p:cxnSp>
+        <p:nvCxnSpPr>
+          <p:cNvPr id="15" name="Straight Arrow Connector 14">
+            <a:extLst>
+              <a:ext uri="{FF2B5EF4-FFF2-40B4-BE49-F238E27FC236}">
+                <a16:creationId xmlns:a16="http://schemas.microsoft.com/office/drawing/2014/main" id="{AF8DF3A2-50C8-4E86-9227-725AF2C0E3F8}"/>
+              </a:ext>
+            </a:extLst>
+          </p:cNvPr>
+          <p:cNvCxnSpPr>
+            <a:cxnSpLocks/>
+            <a:stCxn id="6" idx="2"/>
+            <a:endCxn id="7" idx="0"/>
+          </p:cNvCxnSpPr>
+          <p:nvPr/>
+        </p:nvCxnSpPr>
+        <p:spPr>
+          <a:xfrm>
+            <a:off x="5379720" y="3729363"/>
+            <a:ext cx="0" cy="603884"/>
+          </a:xfrm>
+          <a:prstGeom prst="straightConnector1">
+            <a:avLst/>
+          </a:prstGeom>
+          <a:ln>
+            <a:headEnd type="triangle" w="med" len="med"/>
+            <a:tailEnd type="triangle" w="med" len="med"/>
+          </a:ln>
+        </p:spPr>
+        <p:style>
+          <a:lnRef idx="1">
+            <a:schemeClr val="dk1"/>
+          </a:lnRef>
+          <a:fillRef idx="0">
+            <a:schemeClr val="dk1"/>
+          </a:fillRef>
+          <a:effectRef idx="0">
+            <a:schemeClr val="dk1"/>
+          </a:effectRef>
+          <a:fontRef idx="minor">
+            <a:schemeClr val="tx1"/>
+          </a:fontRef>
+        </p:style>
+      </p:cxnSp>
+      <p:cxnSp>
+        <p:nvCxnSpPr>
+          <p:cNvPr id="16" name="Straight Arrow Connector 15">
+            <a:extLst>
+              <a:ext uri="{FF2B5EF4-FFF2-40B4-BE49-F238E27FC236}">
+                <a16:creationId xmlns:a16="http://schemas.microsoft.com/office/drawing/2014/main" id="{C51E60C8-6F8B-46CF-A78A-C9254329A1D8}"/>
+              </a:ext>
+            </a:extLst>
+          </p:cNvPr>
+          <p:cNvCxnSpPr>
+            <a:cxnSpLocks/>
+            <a:stCxn id="7" idx="2"/>
+            <a:endCxn id="8" idx="0"/>
+          </p:cNvCxnSpPr>
+          <p:nvPr/>
+        </p:nvCxnSpPr>
+        <p:spPr>
+          <a:xfrm>
+            <a:off x="5379720" y="4737107"/>
+            <a:ext cx="0" cy="603884"/>
+          </a:xfrm>
+          <a:prstGeom prst="straightConnector1">
+            <a:avLst/>
+          </a:prstGeom>
+          <a:ln>
+            <a:headEnd type="none" w="med" len="med"/>
+            <a:tailEnd type="triangle" w="med" len="med"/>
+          </a:ln>
+        </p:spPr>
+        <p:style>
+          <a:lnRef idx="1">
+            <a:schemeClr val="dk1"/>
+          </a:lnRef>
+          <a:fillRef idx="0">
+            <a:schemeClr val="dk1"/>
+          </a:fillRef>
+          <a:effectRef idx="0">
+            <a:schemeClr val="dk1"/>
+          </a:effectRef>
+          <a:fontRef idx="minor">
+            <a:schemeClr val="tx1"/>
+          </a:fontRef>
+        </p:style>
+      </p:cxnSp>
+      <p:cxnSp>
+        <p:nvCxnSpPr>
+          <p:cNvPr id="18" name="Straight Arrow Connector 17">
+            <a:extLst>
+              <a:ext uri="{FF2B5EF4-FFF2-40B4-BE49-F238E27FC236}">
+                <a16:creationId xmlns:a16="http://schemas.microsoft.com/office/drawing/2014/main" id="{0C093134-DDDB-47BE-B97E-956F17E60D2A}"/>
+              </a:ext>
+            </a:extLst>
+          </p:cNvPr>
+          <p:cNvCxnSpPr>
+            <a:cxnSpLocks/>
+            <a:stCxn id="2" idx="4"/>
+            <a:endCxn id="3" idx="0"/>
+          </p:cNvCxnSpPr>
+          <p:nvPr/>
+        </p:nvCxnSpPr>
+        <p:spPr>
+          <a:xfrm>
+            <a:off x="1577340" y="1104900"/>
+            <a:ext cx="0" cy="4907280"/>
+          </a:xfrm>
+          <a:prstGeom prst="straightConnector1">
+            <a:avLst/>
+          </a:prstGeom>
+          <a:ln>
+            <a:headEnd type="none" w="med" len="med"/>
+            <a:tailEnd type="triangle" w="med" len="med"/>
+          </a:ln>
+        </p:spPr>
+        <p:style>
+          <a:lnRef idx="1">
+            <a:schemeClr val="dk1"/>
+          </a:lnRef>
+          <a:fillRef idx="0">
+            <a:schemeClr val="dk1"/>
+          </a:fillRef>
+          <a:effectRef idx="0">
+            <a:schemeClr val="dk1"/>
+          </a:effectRef>
+          <a:fontRef idx="minor">
+            <a:schemeClr val="tx1"/>
+          </a:fontRef>
+        </p:style>
+      </p:cxnSp>
+      <p:sp>
+        <p:nvSpPr>
+          <p:cNvPr id="27" name="TextBox 26">
+            <a:extLst>
+              <a:ext uri="{FF2B5EF4-FFF2-40B4-BE49-F238E27FC236}">
+                <a16:creationId xmlns:a16="http://schemas.microsoft.com/office/drawing/2014/main" id="{7135ED3E-EEEC-4024-A1D9-6047FF7EA51B}"/>
+              </a:ext>
+            </a:extLst>
+          </p:cNvPr>
+          <p:cNvSpPr txBox="1"/>
+          <p:nvPr/>
+        </p:nvSpPr>
+        <p:spPr>
+          <a:xfrm>
+            <a:off x="2537460" y="614987"/>
+            <a:ext cx="2026916" cy="461665"/>
+          </a:xfrm>
+          <a:prstGeom prst="rect">
+            <a:avLst/>
+          </a:prstGeom>
+          <a:noFill/>
+        </p:spPr>
+        <p:txBody>
+          <a:bodyPr wrap="square" rtlCol="0">
+            <a:spAutoFit/>
+          </a:bodyPr>
+          <a:lstStyle/>
+          <a:p>
+            <a:pPr algn="ctr"/>
+            <a:r>
+              <a:rPr lang="en-US" sz="1200" dirty="0">
+                <a:latin typeface="Arial" panose="020B0604020202020204" pitchFamily="34" charset="0"/>
+                <a:cs typeface="Arial" panose="020B0604020202020204" pitchFamily="34" charset="0"/>
+              </a:rPr>
+              <a:t>Discretization of 3D printing process</a:t>
+            </a:r>
+          </a:p>
+        </p:txBody>
+      </p:sp>
+      <p:cxnSp>
+        <p:nvCxnSpPr>
+          <p:cNvPr id="55" name="Connector: Elbow 54">
+            <a:extLst>
+              <a:ext uri="{FF2B5EF4-FFF2-40B4-BE49-F238E27FC236}">
+                <a16:creationId xmlns:a16="http://schemas.microsoft.com/office/drawing/2014/main" id="{199F8B3F-545B-4680-A3D6-DA2913666E46}"/>
+              </a:ext>
+            </a:extLst>
+          </p:cNvPr>
+          <p:cNvCxnSpPr>
+            <a:stCxn id="8" idx="2"/>
+            <a:endCxn id="3" idx="2"/>
+          </p:cNvCxnSpPr>
+          <p:nvPr/>
+        </p:nvCxnSpPr>
+        <p:spPr>
+          <a:xfrm rot="5400000">
+            <a:off x="3541081" y="4432620"/>
+            <a:ext cx="526409" cy="3150870"/>
+          </a:xfrm>
+          <a:prstGeom prst="bentConnector2">
+            <a:avLst/>
+          </a:prstGeom>
+          <a:ln w="6350">
+            <a:tailEnd type="triangle"/>
+          </a:ln>
+        </p:spPr>
+        <p:style>
+          <a:lnRef idx="1">
+            <a:schemeClr val="dk1"/>
+          </a:lnRef>
+          <a:fillRef idx="0">
+            <a:schemeClr val="dk1"/>
+          </a:fillRef>
+          <a:effectRef idx="0">
+            <a:schemeClr val="dk1"/>
+          </a:effectRef>
+          <a:fontRef idx="minor">
+            <a:schemeClr val="tx1"/>
+          </a:fontRef>
+        </p:style>
+      </p:cxnSp>
+      <p:cxnSp>
+        <p:nvCxnSpPr>
+          <p:cNvPr id="71" name="Connector: Elbow 70">
+            <a:extLst>
+              <a:ext uri="{FF2B5EF4-FFF2-40B4-BE49-F238E27FC236}">
+                <a16:creationId xmlns:a16="http://schemas.microsoft.com/office/drawing/2014/main" id="{8F3C6A1C-2650-4307-A9EA-5F77C94E7061}"/>
+              </a:ext>
+            </a:extLst>
+          </p:cNvPr>
+          <p:cNvCxnSpPr>
+            <a:cxnSpLocks/>
+            <a:stCxn id="2" idx="2"/>
+            <a:endCxn id="4" idx="0"/>
+          </p:cNvCxnSpPr>
+          <p:nvPr/>
+        </p:nvCxnSpPr>
+        <p:spPr>
+          <a:xfrm>
+            <a:off x="2228850" y="845820"/>
+            <a:ext cx="3150870" cy="464195"/>
+          </a:xfrm>
+          <a:prstGeom prst="bentConnector2">
+            <a:avLst/>
+          </a:prstGeom>
+          <a:ln>
+            <a:tailEnd type="triangle"/>
+          </a:ln>
+        </p:spPr>
+        <p:style>
+          <a:lnRef idx="1">
+            <a:schemeClr val="dk1"/>
+          </a:lnRef>
+          <a:fillRef idx="0">
+            <a:schemeClr val="dk1"/>
+          </a:fillRef>
+          <a:effectRef idx="0">
+            <a:schemeClr val="dk1"/>
+          </a:effectRef>
+          <a:fontRef idx="minor">
+            <a:schemeClr val="tx1"/>
+          </a:fontRef>
+        </p:style>
+      </p:cxnSp>
+      <p:grpSp>
+        <p:nvGrpSpPr>
+          <p:cNvPr id="94" name="Group 93">
+            <a:extLst>
+              <a:ext uri="{FF2B5EF4-FFF2-40B4-BE49-F238E27FC236}">
+                <a16:creationId xmlns:a16="http://schemas.microsoft.com/office/drawing/2014/main" id="{78488609-21A1-469A-B630-08CE2C6DED01}"/>
+              </a:ext>
+            </a:extLst>
+          </p:cNvPr>
+          <p:cNvGrpSpPr/>
+          <p:nvPr/>
+        </p:nvGrpSpPr>
+        <p:grpSpPr>
+          <a:xfrm>
+            <a:off x="3872402" y="1226820"/>
+            <a:ext cx="791038" cy="4580856"/>
+            <a:chOff x="3872402" y="1226820"/>
+            <a:chExt cx="791038" cy="4580856"/>
+          </a:xfrm>
+        </p:grpSpPr>
+        <p:grpSp>
+          <p:nvGrpSpPr>
+            <p:cNvPr id="91" name="Group 90">
+              <a:extLst>
+                <a:ext uri="{FF2B5EF4-FFF2-40B4-BE49-F238E27FC236}">
+                  <a16:creationId xmlns:a16="http://schemas.microsoft.com/office/drawing/2014/main" id="{1493E925-B4C9-4303-A87C-6B945203E12C}"/>
+                </a:ext>
+              </a:extLst>
+            </p:cNvPr>
+            <p:cNvGrpSpPr/>
+            <p:nvPr/>
+          </p:nvGrpSpPr>
+          <p:grpSpPr>
+            <a:xfrm>
+              <a:off x="4183380" y="1226820"/>
+              <a:ext cx="480060" cy="4580856"/>
+              <a:chOff x="4183380" y="1226820"/>
+              <a:chExt cx="480060" cy="4678680"/>
+            </a:xfrm>
+          </p:grpSpPr>
+          <p:cxnSp>
+            <p:nvCxnSpPr>
+              <p:cNvPr id="85" name="Straight Connector 84">
+                <a:extLst>
+                  <a:ext uri="{FF2B5EF4-FFF2-40B4-BE49-F238E27FC236}">
+                    <a16:creationId xmlns:a16="http://schemas.microsoft.com/office/drawing/2014/main" id="{1F271041-62FE-462D-BC57-23D4E9F5AFCF}"/>
+                  </a:ext>
+                </a:extLst>
+              </p:cNvPr>
+              <p:cNvCxnSpPr/>
+              <p:nvPr/>
+            </p:nvCxnSpPr>
+            <p:spPr>
+              <a:xfrm flipH="1">
+                <a:off x="4191000" y="1226820"/>
+                <a:ext cx="472440" cy="0"/>
+              </a:xfrm>
+              <a:prstGeom prst="line">
+                <a:avLst/>
+              </a:prstGeom>
+            </p:spPr>
+            <p:style>
+              <a:lnRef idx="1">
+                <a:schemeClr val="dk1"/>
+              </a:lnRef>
+              <a:fillRef idx="0">
+                <a:schemeClr val="dk1"/>
+              </a:fillRef>
+              <a:effectRef idx="0">
+                <a:schemeClr val="dk1"/>
+              </a:effectRef>
+              <a:fontRef idx="minor">
+                <a:schemeClr val="tx1"/>
+              </a:fontRef>
+            </p:style>
+          </p:cxnSp>
+          <p:cxnSp>
+            <p:nvCxnSpPr>
+              <p:cNvPr id="86" name="Straight Connector 85">
+                <a:extLst>
+                  <a:ext uri="{FF2B5EF4-FFF2-40B4-BE49-F238E27FC236}">
+                    <a16:creationId xmlns:a16="http://schemas.microsoft.com/office/drawing/2014/main" id="{70348A39-838A-4736-B067-2AE8345EE4D3}"/>
+                  </a:ext>
+                </a:extLst>
+              </p:cNvPr>
+              <p:cNvCxnSpPr/>
+              <p:nvPr/>
+            </p:nvCxnSpPr>
+            <p:spPr>
+              <a:xfrm flipH="1">
+                <a:off x="4183380" y="5905500"/>
+                <a:ext cx="472440" cy="0"/>
+              </a:xfrm>
+              <a:prstGeom prst="line">
+                <a:avLst/>
+              </a:prstGeom>
+            </p:spPr>
+            <p:style>
+              <a:lnRef idx="1">
+                <a:schemeClr val="dk1"/>
+              </a:lnRef>
+              <a:fillRef idx="0">
+                <a:schemeClr val="dk1"/>
+              </a:fillRef>
+              <a:effectRef idx="0">
+                <a:schemeClr val="dk1"/>
+              </a:effectRef>
+              <a:fontRef idx="minor">
+                <a:schemeClr val="tx1"/>
+              </a:fontRef>
+            </p:style>
+          </p:cxnSp>
+          <p:cxnSp>
+            <p:nvCxnSpPr>
+              <p:cNvPr id="88" name="Straight Connector 87">
+                <a:extLst>
+                  <a:ext uri="{FF2B5EF4-FFF2-40B4-BE49-F238E27FC236}">
+                    <a16:creationId xmlns:a16="http://schemas.microsoft.com/office/drawing/2014/main" id="{C21832C1-1C5D-47B4-B03F-F2ECA7F95DF3}"/>
+                  </a:ext>
+                </a:extLst>
+              </p:cNvPr>
+              <p:cNvCxnSpPr>
+                <a:cxnSpLocks/>
+              </p:cNvCxnSpPr>
+              <p:nvPr/>
+            </p:nvCxnSpPr>
+            <p:spPr>
+              <a:xfrm flipH="1">
+                <a:off x="4183380" y="1226820"/>
+                <a:ext cx="7620" cy="4678680"/>
+              </a:xfrm>
+              <a:prstGeom prst="line">
+                <a:avLst/>
+              </a:prstGeom>
+            </p:spPr>
+            <p:style>
+              <a:lnRef idx="1">
+                <a:schemeClr val="dk1"/>
+              </a:lnRef>
+              <a:fillRef idx="0">
+                <a:schemeClr val="dk1"/>
+              </a:fillRef>
+              <a:effectRef idx="0">
+                <a:schemeClr val="dk1"/>
+              </a:effectRef>
+              <a:fontRef idx="minor">
+                <a:schemeClr val="tx1"/>
+              </a:fontRef>
+            </p:style>
+          </p:cxnSp>
+        </p:grpSp>
+        <p:cxnSp>
+          <p:nvCxnSpPr>
+            <p:cNvPr id="93" name="Straight Connector 92">
+              <a:extLst>
+                <a:ext uri="{FF2B5EF4-FFF2-40B4-BE49-F238E27FC236}">
+                  <a16:creationId xmlns:a16="http://schemas.microsoft.com/office/drawing/2014/main" id="{D2D5B4E6-C5DD-461C-AC5C-9FBCD7C5177B}"/>
+                </a:ext>
+              </a:extLst>
+            </p:cNvPr>
+            <p:cNvCxnSpPr/>
+            <p:nvPr/>
+          </p:nvCxnSpPr>
+          <p:spPr>
+            <a:xfrm flipH="1">
+              <a:off x="3872402" y="3429000"/>
+              <a:ext cx="310978" cy="0"/>
+            </a:xfrm>
+            <a:prstGeom prst="line">
+              <a:avLst/>
+            </a:prstGeom>
+          </p:spPr>
+          <p:style>
+            <a:lnRef idx="1">
+              <a:schemeClr val="dk1"/>
+            </a:lnRef>
+            <a:fillRef idx="0">
+              <a:schemeClr val="dk1"/>
+            </a:fillRef>
+            <a:effectRef idx="0">
+              <a:schemeClr val="dk1"/>
+            </a:effectRef>
+            <a:fontRef idx="minor">
+              <a:schemeClr val="tx1"/>
+            </a:fontRef>
+          </p:style>
+        </p:cxnSp>
+      </p:grpSp>
+      <p:sp>
+        <p:nvSpPr>
+          <p:cNvPr id="95" name="TextBox 94">
+            <a:extLst>
+              <a:ext uri="{FF2B5EF4-FFF2-40B4-BE49-F238E27FC236}">
+                <a16:creationId xmlns:a16="http://schemas.microsoft.com/office/drawing/2014/main" id="{7BC79758-0B5C-4D03-97BF-EB94C9743E2A}"/>
+              </a:ext>
+            </a:extLst>
+          </p:cNvPr>
+          <p:cNvSpPr txBox="1"/>
+          <p:nvPr/>
+        </p:nvSpPr>
+        <p:spPr>
+          <a:xfrm>
+            <a:off x="2102709" y="3187030"/>
+            <a:ext cx="2026916" cy="461665"/>
+          </a:xfrm>
+          <a:prstGeom prst="rect">
+            <a:avLst/>
+          </a:prstGeom>
+          <a:noFill/>
+        </p:spPr>
+        <p:txBody>
+          <a:bodyPr wrap="square" rtlCol="0">
+            <a:spAutoFit/>
+          </a:bodyPr>
+          <a:lstStyle/>
+          <a:p>
+            <a:pPr algn="ctr"/>
+            <a:r>
+              <a:rPr lang="en-US" sz="1200" dirty="0">
+                <a:latin typeface="Arial" panose="020B0604020202020204" pitchFamily="34" charset="0"/>
+                <a:cs typeface="Arial" panose="020B0604020202020204" pitchFamily="34" charset="0"/>
+              </a:rPr>
+              <a:t>Multi-Level Collision Avoidance</a:t>
+            </a:r>
+          </a:p>
+        </p:txBody>
+      </p:sp>
+      <p:sp>
+        <p:nvSpPr>
+          <p:cNvPr id="97" name="TextBox 96">
+            <a:extLst>
+              <a:ext uri="{FF2B5EF4-FFF2-40B4-BE49-F238E27FC236}">
+                <a16:creationId xmlns:a16="http://schemas.microsoft.com/office/drawing/2014/main" id="{41FB9E20-93C9-4AEE-9E78-1591E99F2920}"/>
+              </a:ext>
+            </a:extLst>
+          </p:cNvPr>
+          <p:cNvSpPr txBox="1"/>
+          <p:nvPr/>
+        </p:nvSpPr>
+        <p:spPr>
+          <a:xfrm rot="16200000">
+            <a:off x="270899" y="3187030"/>
+            <a:ext cx="2589682" cy="461665"/>
+          </a:xfrm>
+          <a:prstGeom prst="rect">
+            <a:avLst/>
+          </a:prstGeom>
+          <a:noFill/>
+        </p:spPr>
+        <p:txBody>
+          <a:bodyPr wrap="square" rtlCol="0">
+            <a:spAutoFit/>
+          </a:bodyPr>
+          <a:lstStyle/>
+          <a:p>
+            <a:pPr algn="ctr"/>
+            <a:r>
+              <a:rPr lang="en-US" sz="1200" dirty="0">
+                <a:latin typeface="Arial" panose="020B0604020202020204" pitchFamily="34" charset="0"/>
+                <a:cs typeface="Arial" panose="020B0604020202020204" pitchFamily="34" charset="0"/>
+              </a:rPr>
+              <a:t>Continuous 3D Process</a:t>
+            </a:r>
+          </a:p>
+          <a:p>
+            <a:pPr algn="ctr"/>
+            <a:r>
+              <a:rPr lang="en-US" sz="1200" dirty="0">
+                <a:latin typeface="Arial" panose="020B0604020202020204" pitchFamily="34" charset="0"/>
+                <a:cs typeface="Arial" panose="020B0604020202020204" pitchFamily="34" charset="0"/>
+              </a:rPr>
+              <a:t>Direct planning with multi-robots</a:t>
+            </a:r>
+          </a:p>
+        </p:txBody>
+      </p:sp>
     </p:spTree>
     <p:extLst>
       <p:ext uri="{BB962C8B-B14F-4D97-AF65-F5344CB8AC3E}">
-        <p14:creationId xmlns:p14="http://schemas.microsoft.com/office/powerpoint/2010/main" val="894744456"/>
+        <p14:creationId xmlns:p14="http://schemas.microsoft.com/office/powerpoint/2010/main" val="171557407"/>
       </p:ext>
     </p:extLst>
   </p:cSld>
@@ -3728,7 +4927,7 @@
     </p:spTree>
     <p:extLst>
       <p:ext uri="{BB962C8B-B14F-4D97-AF65-F5344CB8AC3E}">
-        <p14:creationId xmlns:p14="http://schemas.microsoft.com/office/powerpoint/2010/main" val="171557407"/>
+        <p14:creationId xmlns:p14="http://schemas.microsoft.com/office/powerpoint/2010/main" val="1568482748"/>
       </p:ext>
     </p:extLst>
   </p:cSld>
@@ -3758,7 +4957,7 @@
     </p:spTree>
     <p:extLst>
       <p:ext uri="{BB962C8B-B14F-4D97-AF65-F5344CB8AC3E}">
-        <p14:creationId xmlns:p14="http://schemas.microsoft.com/office/powerpoint/2010/main" val="1568482748"/>
+        <p14:creationId xmlns:p14="http://schemas.microsoft.com/office/powerpoint/2010/main" val="3771436389"/>
       </p:ext>
     </p:extLst>
   </p:cSld>
@@ -3788,7 +4987,7 @@
     </p:spTree>
     <p:extLst>
       <p:ext uri="{BB962C8B-B14F-4D97-AF65-F5344CB8AC3E}">
-        <p14:creationId xmlns:p14="http://schemas.microsoft.com/office/powerpoint/2010/main" val="3771436389"/>
+        <p14:creationId xmlns:p14="http://schemas.microsoft.com/office/powerpoint/2010/main" val="1714616075"/>
       </p:ext>
     </p:extLst>
   </p:cSld>
@@ -3818,7 +5017,7 @@
     </p:spTree>
     <p:extLst>
       <p:ext uri="{BB962C8B-B14F-4D97-AF65-F5344CB8AC3E}">
-        <p14:creationId xmlns:p14="http://schemas.microsoft.com/office/powerpoint/2010/main" val="1714616075"/>
+        <p14:creationId xmlns:p14="http://schemas.microsoft.com/office/powerpoint/2010/main" val="2238491818"/>
       </p:ext>
     </p:extLst>
   </p:cSld>
@@ -3848,7 +5047,7 @@
     </p:spTree>
     <p:extLst>
       <p:ext uri="{BB962C8B-B14F-4D97-AF65-F5344CB8AC3E}">
-        <p14:creationId xmlns:p14="http://schemas.microsoft.com/office/powerpoint/2010/main" val="2238491818"/>
+        <p14:creationId xmlns:p14="http://schemas.microsoft.com/office/powerpoint/2010/main" val="1548171826"/>
       </p:ext>
     </p:extLst>
   </p:cSld>
@@ -3878,7 +5077,7 @@
     </p:spTree>
     <p:extLst>
       <p:ext uri="{BB962C8B-B14F-4D97-AF65-F5344CB8AC3E}">
-        <p14:creationId xmlns:p14="http://schemas.microsoft.com/office/powerpoint/2010/main" val="1548171826"/>
+        <p14:creationId xmlns:p14="http://schemas.microsoft.com/office/powerpoint/2010/main" val="183114961"/>
       </p:ext>
     </p:extLst>
   </p:cSld>
@@ -3908,7 +5107,7 @@
     </p:spTree>
     <p:extLst>
       <p:ext uri="{BB962C8B-B14F-4D97-AF65-F5344CB8AC3E}">
-        <p14:creationId xmlns:p14="http://schemas.microsoft.com/office/powerpoint/2010/main" val="183114961"/>
+        <p14:creationId xmlns:p14="http://schemas.microsoft.com/office/powerpoint/2010/main" val="3584881541"/>
       </p:ext>
     </p:extLst>
   </p:cSld>

</xml_diff>